<commit_message>
Improved version of chart
- fixing position of labels
- Line border of arrows in cloud foundry area was hard to read
</commit_message>
<xml_diff>
--- a/docs/raw/architecture.pptx
+++ b/docs/raw/architecture.pptx
@@ -104,6 +104,11 @@
       </a:defRPr>
     </a:lvl9pPr>
   </p:defaultTextStyle>
+  <p:extLst>
+    <p:ext uri="{EFAFB233-063F-42B5-8137-9DF3F51BA10A}">
+      <p15:sldGuideLst xmlns:p15="http://schemas.microsoft.com/office/powerpoint/2012/main"/>
+    </p:ext>
+  </p:extLst>
 </p:presentation>
 </file>
 
@@ -3130,8 +3135,8 @@
         </p:nvSpPr>
         <p:spPr>
           <a:xfrm>
-            <a:off x="2404504" y="3625879"/>
-            <a:ext cx="1711109" cy="276999"/>
+            <a:off x="2817700" y="3625879"/>
+            <a:ext cx="1026948" cy="461665"/>
           </a:xfrm>
           <a:prstGeom prst="rect">
             <a:avLst/>
@@ -3144,6 +3149,7 @@
           </a:bodyPr>
           <a:lstStyle/>
           <a:p>
+            <a:pPr algn="ctr"/>
             <a:r>
               <a:rPr lang="de-DE" sz="1200" dirty="0" err="1" smtClean="0"/>
               <a:t>text</a:t>
@@ -3160,6 +3166,13 @@
               <a:rPr lang="de-DE" sz="1200" dirty="0" smtClean="0"/>
               <a:t>; </a:t>
             </a:r>
+            <a:r>
+              <a:rPr lang="de-DE" sz="1200" dirty="0" smtClean="0"/>
+              <a:t/>
+            </a:r>
+            <a:br>
+              <a:rPr lang="de-DE" sz="1200" dirty="0" smtClean="0"/>
+            </a:br>
             <a:r>
               <a:rPr lang="de-DE" sz="1200" dirty="0" err="1" smtClean="0"/>
               <a:t>version</a:t>
@@ -3302,7 +3315,7 @@
         </p:nvSpPr>
         <p:spPr>
           <a:xfrm>
-            <a:off x="7217389" y="4387152"/>
+            <a:off x="7047194" y="4664338"/>
             <a:ext cx="665439" cy="369332"/>
           </a:xfrm>
           <a:prstGeom prst="rect">
@@ -3977,8 +3990,8 @@
         </p:nvSpPr>
         <p:spPr>
           <a:xfrm>
-            <a:off x="6360516" y="3680251"/>
-            <a:ext cx="1711109" cy="276999"/>
+            <a:off x="6695908" y="3658996"/>
+            <a:ext cx="1026948" cy="461665"/>
           </a:xfrm>
           <a:prstGeom prst="rect">
             <a:avLst/>
@@ -3991,6 +4004,7 @@
           </a:bodyPr>
           <a:lstStyle/>
           <a:p>
+            <a:pPr algn="ctr"/>
             <a:r>
               <a:rPr lang="de-DE" sz="1200" dirty="0" err="1" smtClean="0"/>
               <a:t>text</a:t>
@@ -4007,6 +4021,13 @@
               <a:rPr lang="de-DE" sz="1200" dirty="0" smtClean="0"/>
               <a:t>; </a:t>
             </a:r>
+            <a:r>
+              <a:rPr lang="de-DE" sz="1200" dirty="0" smtClean="0"/>
+              <a:t/>
+            </a:r>
+            <a:br>
+              <a:rPr lang="de-DE" sz="1200" dirty="0" smtClean="0"/>
+            </a:br>
             <a:r>
               <a:rPr lang="de-DE" sz="1200" dirty="0" err="1" smtClean="0"/>
               <a:t>version</a:t>
@@ -4033,6 +4054,11 @@
           <a:prstGeom prst="rightArrow">
             <a:avLst/>
           </a:prstGeom>
+          <a:ln w="19050">
+            <a:solidFill>
+              <a:schemeClr val="tx1"/>
+            </a:solidFill>
+          </a:ln>
         </p:spPr>
         <p:style>
           <a:lnRef idx="2">
@@ -4073,6 +4099,11 @@
           <a:prstGeom prst="rightArrow">
             <a:avLst/>
           </a:prstGeom>
+          <a:ln w="19050">
+            <a:solidFill>
+              <a:schemeClr val="tx1"/>
+            </a:solidFill>
+          </a:ln>
         </p:spPr>
         <p:style>
           <a:lnRef idx="2">
@@ -4113,6 +4144,11 @@
           <a:prstGeom prst="rightArrow">
             <a:avLst/>
           </a:prstGeom>
+          <a:ln w="19050">
+            <a:solidFill>
+              <a:schemeClr val="tx1"/>
+            </a:solidFill>
+          </a:ln>
         </p:spPr>
         <p:style>
           <a:lnRef idx="2">

</xml_diff>

<commit_message>
Updating architecture picture with X-CF-APP-INSTANCE
</commit_message>
<xml_diff>
--- a/docs/raw/architecture.pptx
+++ b/docs/raw/architecture.pptx
@@ -243,7 +243,7 @@
           <a:p>
             <a:fld id="{A1B2E956-D1D5-40D0-8E6E-9ABCE3FE8947}" type="datetimeFigureOut">
               <a:rPr lang="de-DE" smtClean="0"/>
-              <a:t>03.03.2018</a:t>
+              <a:t>04.03.2018</a:t>
             </a:fld>
             <a:endParaRPr lang="de-DE"/>
           </a:p>
@@ -413,7 +413,7 @@
           <a:p>
             <a:fld id="{A1B2E956-D1D5-40D0-8E6E-9ABCE3FE8947}" type="datetimeFigureOut">
               <a:rPr lang="de-DE" smtClean="0"/>
-              <a:t>03.03.2018</a:t>
+              <a:t>04.03.2018</a:t>
             </a:fld>
             <a:endParaRPr lang="de-DE"/>
           </a:p>
@@ -593,7 +593,7 @@
           <a:p>
             <a:fld id="{A1B2E956-D1D5-40D0-8E6E-9ABCE3FE8947}" type="datetimeFigureOut">
               <a:rPr lang="de-DE" smtClean="0"/>
-              <a:t>03.03.2018</a:t>
+              <a:t>04.03.2018</a:t>
             </a:fld>
             <a:endParaRPr lang="de-DE"/>
           </a:p>
@@ -763,7 +763,7 @@
           <a:p>
             <a:fld id="{A1B2E956-D1D5-40D0-8E6E-9ABCE3FE8947}" type="datetimeFigureOut">
               <a:rPr lang="de-DE" smtClean="0"/>
-              <a:t>03.03.2018</a:t>
+              <a:t>04.03.2018</a:t>
             </a:fld>
             <a:endParaRPr lang="de-DE"/>
           </a:p>
@@ -1009,7 +1009,7 @@
           <a:p>
             <a:fld id="{A1B2E956-D1D5-40D0-8E6E-9ABCE3FE8947}" type="datetimeFigureOut">
               <a:rPr lang="de-DE" smtClean="0"/>
-              <a:t>03.03.2018</a:t>
+              <a:t>04.03.2018</a:t>
             </a:fld>
             <a:endParaRPr lang="de-DE"/>
           </a:p>
@@ -1241,7 +1241,7 @@
           <a:p>
             <a:fld id="{A1B2E956-D1D5-40D0-8E6E-9ABCE3FE8947}" type="datetimeFigureOut">
               <a:rPr lang="de-DE" smtClean="0"/>
-              <a:t>03.03.2018</a:t>
+              <a:t>04.03.2018</a:t>
             </a:fld>
             <a:endParaRPr lang="de-DE"/>
           </a:p>
@@ -1608,7 +1608,7 @@
           <a:p>
             <a:fld id="{A1B2E956-D1D5-40D0-8E6E-9ABCE3FE8947}" type="datetimeFigureOut">
               <a:rPr lang="de-DE" smtClean="0"/>
-              <a:t>03.03.2018</a:t>
+              <a:t>04.03.2018</a:t>
             </a:fld>
             <a:endParaRPr lang="de-DE"/>
           </a:p>
@@ -1726,7 +1726,7 @@
           <a:p>
             <a:fld id="{A1B2E956-D1D5-40D0-8E6E-9ABCE3FE8947}" type="datetimeFigureOut">
               <a:rPr lang="de-DE" smtClean="0"/>
-              <a:t>03.03.2018</a:t>
+              <a:t>04.03.2018</a:t>
             </a:fld>
             <a:endParaRPr lang="de-DE"/>
           </a:p>
@@ -1821,7 +1821,7 @@
           <a:p>
             <a:fld id="{A1B2E956-D1D5-40D0-8E6E-9ABCE3FE8947}" type="datetimeFigureOut">
               <a:rPr lang="de-DE" smtClean="0"/>
-              <a:t>03.03.2018</a:t>
+              <a:t>04.03.2018</a:t>
             </a:fld>
             <a:endParaRPr lang="de-DE"/>
           </a:p>
@@ -2098,7 +2098,7 @@
           <a:p>
             <a:fld id="{A1B2E956-D1D5-40D0-8E6E-9ABCE3FE8947}" type="datetimeFigureOut">
               <a:rPr lang="de-DE" smtClean="0"/>
-              <a:t>03.03.2018</a:t>
+              <a:t>04.03.2018</a:t>
             </a:fld>
             <a:endParaRPr lang="de-DE"/>
           </a:p>
@@ -2351,7 +2351,7 @@
           <a:p>
             <a:fld id="{A1B2E956-D1D5-40D0-8E6E-9ABCE3FE8947}" type="datetimeFigureOut">
               <a:rPr lang="de-DE" smtClean="0"/>
-              <a:t>03.03.2018</a:t>
+              <a:t>04.03.2018</a:t>
             </a:fld>
             <a:endParaRPr lang="de-DE"/>
           </a:p>
@@ -2564,7 +2564,7 @@
           <a:p>
             <a:fld id="{A1B2E956-D1D5-40D0-8E6E-9ABCE3FE8947}" type="datetimeFigureOut">
               <a:rPr lang="de-DE" smtClean="0"/>
-              <a:t>03.03.2018</a:t>
+              <a:t>04.03.2018</a:t>
             </a:fld>
             <a:endParaRPr lang="de-DE"/>
           </a:p>
@@ -3166,10 +3166,6 @@
               <a:rPr lang="de-DE" sz="1200" dirty="0" smtClean="0"/>
               <a:t>; </a:t>
             </a:r>
-            <a:r>
-              <a:rPr lang="de-DE" sz="1200" dirty="0" smtClean="0"/>
-              <a:t/>
-            </a:r>
             <a:br>
               <a:rPr lang="de-DE" sz="1200" dirty="0" smtClean="0"/>
             </a:br>
@@ -3990,8 +3986,8 @@
         </p:nvSpPr>
         <p:spPr>
           <a:xfrm>
-            <a:off x="6695908" y="3658996"/>
-            <a:ext cx="1026948" cy="461665"/>
+            <a:off x="6363945" y="3680251"/>
+            <a:ext cx="1535741" cy="646331"/>
           </a:xfrm>
           <a:prstGeom prst="rect">
             <a:avLst/>
@@ -4021,10 +4017,6 @@
               <a:rPr lang="de-DE" sz="1200" dirty="0" smtClean="0"/>
               <a:t>; </a:t>
             </a:r>
-            <a:r>
-              <a:rPr lang="de-DE" sz="1200" dirty="0" smtClean="0"/>
-              <a:t/>
-            </a:r>
             <a:br>
               <a:rPr lang="de-DE" sz="1200" dirty="0" smtClean="0"/>
             </a:br>
@@ -4036,6 +4028,17 @@
               <a:rPr lang="de-DE" sz="1200" dirty="0" smtClean="0"/>
               <a:t>=0.0.4</a:t>
             </a:r>
+          </a:p>
+          <a:p>
+            <a:pPr algn="ctr"/>
+            <a:r>
+              <a:rPr lang="de-DE" sz="1200" dirty="0" smtClean="0"/>
+              <a:t>+ </a:t>
+            </a:r>
+            <a:r>
+              <a:rPr lang="de-DE" sz="1200" dirty="0"/>
+              <a:t>X-CF-APP-INSTANCE</a:t>
+            </a:r>
             <a:endParaRPr lang="de-DE" sz="1200" dirty="0"/>
           </a:p>
         </p:txBody>
@@ -4054,7 +4057,7 @@
           <a:prstGeom prst="rightArrow">
             <a:avLst/>
           </a:prstGeom>
-          <a:ln w="19050">
+          <a:ln w="12700">
             <a:solidFill>
               <a:schemeClr val="tx1"/>
             </a:solidFill>
@@ -4099,7 +4102,7 @@
           <a:prstGeom prst="rightArrow">
             <a:avLst/>
           </a:prstGeom>
-          <a:ln w="19050">
+          <a:ln w="12700">
             <a:solidFill>
               <a:schemeClr val="tx1"/>
             </a:solidFill>
@@ -4144,7 +4147,7 @@
           <a:prstGeom prst="rightArrow">
             <a:avLst/>
           </a:prstGeom>
-          <a:ln w="19050">
+          <a:ln w="12700">
             <a:solidFill>
               <a:schemeClr val="tx1"/>
             </a:solidFill>

</xml_diff>

<commit_message>
Clarifying that ha_proxy is the CF's web dispatcher
</commit_message>
<xml_diff>
--- a/docs/raw/architecture.pptx
+++ b/docs/raw/architecture.pptx
@@ -3447,10 +3447,25 @@
           <a:p>
             <a:pPr algn="ctr"/>
             <a:r>
-              <a:rPr lang="de-DE" dirty="0" err="1" smtClean="0"/>
+              <a:rPr lang="de-DE" dirty="0" smtClean="0"/>
+              <a:t>Web Dispatcher</a:t>
+            </a:r>
+            <a:br>
+              <a:rPr lang="de-DE" dirty="0" smtClean="0"/>
+            </a:br>
+            <a:r>
+              <a:rPr lang="de-DE" sz="1200" dirty="0" smtClean="0"/>
+              <a:t>(</a:t>
+            </a:r>
+            <a:r>
+              <a:rPr lang="de-DE" sz="1200" dirty="0" err="1" smtClean="0"/>
               <a:t>ha_proxy</a:t>
             </a:r>
-            <a:endParaRPr lang="de-DE" dirty="0"/>
+            <a:r>
+              <a:rPr lang="de-DE" sz="1200" dirty="0" smtClean="0"/>
+              <a:t>)</a:t>
+            </a:r>
+            <a:endParaRPr lang="de-DE" sz="1200" dirty="0"/>
           </a:p>
         </p:txBody>
       </p:sp>
@@ -4039,7 +4054,6 @@
               <a:rPr lang="de-DE" sz="1200" dirty="0"/>
               <a:t>X-CF-APP-INSTANCE</a:t>
             </a:r>
-            <a:endParaRPr lang="de-DE" sz="1200" dirty="0"/>
           </a:p>
         </p:txBody>
       </p:sp>

</xml_diff>